<commit_message>
kis aprosag a vegen
</commit_message>
<xml_diff>
--- a/Terület kerület térfogat.pptx
+++ b/Terület kerület térfogat.pptx
@@ -5,10 +5,10 @@
     <p:sldMasterId id="2147483648" r:id="rId4"/>
   </p:sldMasterIdLst>
   <p:notesMasterIdLst>
-    <p:notesMasterId r:id="rId16"/>
+    <p:notesMasterId r:id="rId17"/>
   </p:notesMasterIdLst>
   <p:handoutMasterIdLst>
-    <p:handoutMasterId r:id="rId17"/>
+    <p:handoutMasterId r:id="rId18"/>
   </p:handoutMasterIdLst>
   <p:sldIdLst>
     <p:sldId id="277" r:id="rId5"/>
@@ -17,11 +17,12 @@
     <p:sldId id="279" r:id="rId8"/>
     <p:sldId id="280" r:id="rId9"/>
     <p:sldId id="281" r:id="rId10"/>
-    <p:sldId id="284" r:id="rId11"/>
-    <p:sldId id="286" r:id="rId12"/>
-    <p:sldId id="287" r:id="rId13"/>
-    <p:sldId id="289" r:id="rId14"/>
-    <p:sldId id="288" r:id="rId15"/>
+    <p:sldId id="286" r:id="rId11"/>
+    <p:sldId id="290" r:id="rId12"/>
+    <p:sldId id="291" r:id="rId13"/>
+    <p:sldId id="287" r:id="rId14"/>
+    <p:sldId id="289" r:id="rId15"/>
+    <p:sldId id="288" r:id="rId16"/>
   </p:sldIdLst>
   <p:sldSz cx="12192000" cy="6858000"/>
   <p:notesSz cx="6858000" cy="9144000"/>
@@ -215,7 +216,7 @@
             <a:pPr rtl="0"/>
             <a:fld id="{0101B00A-32B0-4CAF-9F89-3C63AD2E553A}" type="datetime1">
               <a:rPr lang="hu-HU" smtClean="0"/>
-              <a:t>2022.12.07.</a:t>
+              <a:t>2022.12.08.</a:t>
             </a:fld>
             <a:endParaRPr lang="hu-HU" dirty="0"/>
           </a:p>
@@ -384,7 +385,7 @@
             <a:fld id="{A8EE0D3A-CE98-4751-B765-2A7879568A03}" type="datetime1">
               <a:rPr lang="hu-HU" smtClean="0"/>
               <a:pPr/>
-              <a:t>2022.12.07.</a:t>
+              <a:t>2022.12.08.</a:t>
             </a:fld>
             <a:endParaRPr lang="hu-HU" dirty="0"/>
           </a:p>
@@ -1058,7 +1059,7 @@
             <a:pPr rtl="0"/>
             <a:fld id="{581986E7-02C8-4727-B176-AE537A0A0F8C}" type="datetime1">
               <a:rPr lang="hu-HU" noProof="0" smtClean="0"/>
-              <a:t>2022.12.07.</a:t>
+              <a:t>2022.12.08.</a:t>
             </a:fld>
             <a:endParaRPr lang="hu-HU" noProof="0" dirty="0"/>
           </a:p>
@@ -1393,7 +1394,7 @@
             <a:pPr rtl="0"/>
             <a:fld id="{B969DD75-7C66-47CF-879D-AB155124DDEF}" type="datetime1">
               <a:rPr lang="hu-HU" noProof="0" smtClean="0"/>
-              <a:t>2022.12.07.</a:t>
+              <a:t>2022.12.08.</a:t>
             </a:fld>
             <a:endParaRPr lang="hu-HU" noProof="0" dirty="0"/>
           </a:p>
@@ -1671,7 +1672,7 @@
             <a:pPr rtl="0"/>
             <a:fld id="{1932FAEB-06E7-47D2-A643-A32DC6BC05CC}" type="datetime1">
               <a:rPr lang="hu-HU" noProof="0" smtClean="0"/>
-              <a:t>2022.12.07.</a:t>
+              <a:t>2022.12.08.</a:t>
             </a:fld>
             <a:endParaRPr lang="hu-HU" noProof="0" dirty="0"/>
           </a:p>
@@ -2239,7 +2240,7 @@
             <a:pPr rtl="0"/>
             <a:fld id="{7F672C8F-A1DC-4B82-B0F7-E5E96FFAEC72}" type="datetime1">
               <a:rPr lang="hu-HU" noProof="0" smtClean="0"/>
-              <a:t>2022.12.07.</a:t>
+              <a:t>2022.12.08.</a:t>
             </a:fld>
             <a:endParaRPr lang="hu-HU" noProof="0" dirty="0"/>
           </a:p>
@@ -2517,7 +2518,7 @@
             <a:pPr rtl="0"/>
             <a:fld id="{A7877DCF-D950-4A91-B113-1D2BA72650AC}" type="datetime1">
               <a:rPr lang="hu-HU" noProof="0" smtClean="0"/>
-              <a:t>2022.12.07.</a:t>
+              <a:t>2022.12.08.</a:t>
             </a:fld>
             <a:endParaRPr lang="hu-HU" noProof="0" dirty="0"/>
           </a:p>
@@ -3079,7 +3080,7 @@
             <a:pPr rtl="0"/>
             <a:fld id="{32B7E944-FF8D-4B73-BFC6-2B2DC30A9019}" type="datetime1">
               <a:rPr lang="hu-HU" noProof="0" smtClean="0"/>
-              <a:t>2022.12.07.</a:t>
+              <a:t>2022.12.08.</a:t>
             </a:fld>
             <a:endParaRPr lang="hu-HU" noProof="0" dirty="0"/>
           </a:p>
@@ -3405,7 +3406,7 @@
             <a:pPr rtl="0"/>
             <a:fld id="{E3D28717-F4D4-4E78-B1B4-9F99DCF42829}" type="datetime1">
               <a:rPr lang="hu-HU" noProof="0" smtClean="0"/>
-              <a:t>2022.12.07.</a:t>
+              <a:t>2022.12.08.</a:t>
             </a:fld>
             <a:endParaRPr lang="hu-HU" noProof="0" dirty="0"/>
           </a:p>
@@ -3581,7 +3582,7 @@
             <a:pPr rtl="0"/>
             <a:fld id="{811FFB2D-D4EE-4A4D-AF15-5501EFCAAB69}" type="datetime1">
               <a:rPr lang="hu-HU" noProof="0" smtClean="0"/>
-              <a:t>2022.12.07.</a:t>
+              <a:t>2022.12.08.</a:t>
             </a:fld>
             <a:endParaRPr lang="hu-HU" noProof="0" dirty="0"/>
           </a:p>
@@ -3820,7 +3821,7 @@
             <a:pPr rtl="0"/>
             <a:fld id="{10BCE087-A846-484B-897B-11F7CC976F54}" type="datetime1">
               <a:rPr lang="hu-HU" noProof="0" smtClean="0"/>
-              <a:t>2022.12.07.</a:t>
+              <a:t>2022.12.08.</a:t>
             </a:fld>
             <a:endParaRPr lang="hu-HU" noProof="0" dirty="0"/>
           </a:p>
@@ -4020,7 +4021,7 @@
             <a:pPr rtl="0"/>
             <a:fld id="{D3E16357-68F8-4C89-B164-212D51B5A555}" type="datetime1">
               <a:rPr lang="hu-HU" noProof="0" smtClean="0"/>
-              <a:t>2022.12.07.</a:t>
+              <a:t>2022.12.08.</a:t>
             </a:fld>
             <a:endParaRPr lang="hu-HU" noProof="0" dirty="0"/>
           </a:p>
@@ -4296,7 +4297,7 @@
             <a:pPr rtl="0"/>
             <a:fld id="{7907BB58-B913-4C78-9AFA-B1393B0D4E62}" type="datetime1">
               <a:rPr lang="hu-HU" noProof="0" smtClean="0"/>
-              <a:t>2022.12.07.</a:t>
+              <a:t>2022.12.08.</a:t>
             </a:fld>
             <a:endParaRPr lang="hu-HU" noProof="0" dirty="0"/>
           </a:p>
@@ -4562,7 +4563,7 @@
             <a:pPr rtl="0"/>
             <a:fld id="{4CBE41FA-5577-4815-90CE-C942195B1D0E}" type="datetime1">
               <a:rPr lang="hu-HU" noProof="0" smtClean="0"/>
-              <a:t>2022.12.07.</a:t>
+              <a:t>2022.12.08.</a:t>
             </a:fld>
             <a:endParaRPr lang="hu-HU" noProof="0" dirty="0"/>
           </a:p>
@@ -4936,7 +4937,7 @@
             <a:pPr rtl="0"/>
             <a:fld id="{47730967-BB93-416A-ADFF-46D23C7F99DD}" type="datetime1">
               <a:rPr lang="hu-HU" noProof="0" smtClean="0"/>
-              <a:t>2022.12.07.</a:t>
+              <a:t>2022.12.08.</a:t>
             </a:fld>
             <a:endParaRPr lang="hu-HU" noProof="0" dirty="0"/>
           </a:p>
@@ -5084,7 +5085,7 @@
             <a:pPr rtl="0"/>
             <a:fld id="{1A271211-68CE-4DC5-95BF-8CCC584CC729}" type="datetime1">
               <a:rPr lang="hu-HU" noProof="0" smtClean="0"/>
-              <a:t>2022.12.07.</a:t>
+              <a:t>2022.12.08.</a:t>
             </a:fld>
             <a:endParaRPr lang="hu-HU" noProof="0" dirty="0"/>
           </a:p>
@@ -5208,7 +5209,7 @@
             <a:pPr rtl="0"/>
             <a:fld id="{DBC8551B-72FC-465A-B4AA-C8D01144101E}" type="datetime1">
               <a:rPr lang="hu-HU" noProof="0" smtClean="0"/>
-              <a:t>2022.12.07.</a:t>
+              <a:t>2022.12.08.</a:t>
             </a:fld>
             <a:endParaRPr lang="hu-HU" noProof="0" dirty="0"/>
           </a:p>
@@ -5493,7 +5494,7 @@
             <a:pPr rtl="0"/>
             <a:fld id="{31937186-D509-459F-BF98-A410C4CC85E0}" type="datetime1">
               <a:rPr lang="hu-HU" noProof="0" smtClean="0"/>
-              <a:t>2022.12.07.</a:t>
+              <a:t>2022.12.08.</a:t>
             </a:fld>
             <a:endParaRPr lang="hu-HU" noProof="0" dirty="0"/>
           </a:p>
@@ -5818,7 +5819,7 @@
             <a:pPr rtl="0"/>
             <a:fld id="{822C8249-907F-4F77-8CF5-B0D10B0467C8}" type="datetime1">
               <a:rPr lang="hu-HU" noProof="0" smtClean="0"/>
-              <a:t>2022.12.07.</a:t>
+              <a:t>2022.12.08.</a:t>
             </a:fld>
             <a:endParaRPr lang="hu-HU" noProof="0" dirty="0"/>
           </a:p>
@@ -6030,7 +6031,7 @@
             <a:pPr rtl="0"/>
             <a:fld id="{4AD237DC-75F9-4ACB-9DCB-A8FC80DFB04C}" type="datetime1">
               <a:rPr lang="hu-HU" noProof="0" smtClean="0"/>
-              <a:t>2022.12.07.</a:t>
+              <a:t>2022.12.08.</a:t>
             </a:fld>
             <a:endParaRPr lang="hu-HU" noProof="0" dirty="0"/>
           </a:p>
@@ -6555,7 +6556,7 @@
                 <a16:creationId xmlns:a16="http://schemas.microsoft.com/office/drawing/2014/main" id="{3D1E5586-8BB5-40F6-96C3-2E87DD7CE5CD}"/>
               </a:ext>
               <a:ext uri="{C183D7F6-B498-43B3-948B-1728B52AA6E4}">
-                <adec:decorative xmlns="" xmlns:adec="http://schemas.microsoft.com/office/drawing/2017/decorative" val="1"/>
+                <adec:decorative xmlns:adec="http://schemas.microsoft.com/office/drawing/2017/decorative" xmlns="" val="1"/>
               </a:ext>
             </a:extLst>
           </p:cNvPr>
@@ -6652,7 +6653,7 @@
                 <a16:creationId xmlns:a16="http://schemas.microsoft.com/office/drawing/2014/main" id="{8A832D40-B9E2-4CE7-9E0A-B35591EA2035}"/>
               </a:ext>
               <a:ext uri="{C183D7F6-B498-43B3-948B-1728B52AA6E4}">
-                <adec:decorative xmlns="" xmlns:adec="http://schemas.microsoft.com/office/drawing/2017/decorative" val="1"/>
+                <adec:decorative xmlns:adec="http://schemas.microsoft.com/office/drawing/2017/decorative" xmlns="" val="1"/>
               </a:ext>
             </a:extLst>
           </p:cNvPr>
@@ -6783,6 +6784,90 @@
         </p:nvSpPr>
         <p:spPr>
           <a:xfrm>
+            <a:off x="300039" y="133351"/>
+            <a:ext cx="2257424" cy="895416"/>
+          </a:xfrm>
+        </p:spPr>
+        <p:txBody>
+          <a:bodyPr>
+            <a:normAutofit/>
+          </a:bodyPr>
+          <a:lstStyle/>
+          <a:p>
+            <a:r>
+              <a:rPr lang="hu-HU" dirty="0" err="1" smtClean="0"/>
+              <a:t>App</a:t>
+            </a:r>
+            <a:endParaRPr lang="hu-HU" dirty="0"/>
+          </a:p>
+        </p:txBody>
+      </p:sp>
+      <p:pic>
+        <p:nvPicPr>
+          <p:cNvPr id="3" name="Kép 2"/>
+          <p:cNvPicPr>
+            <a:picLocks noChangeAspect="1"/>
+          </p:cNvPicPr>
+          <p:nvPr/>
+        </p:nvPicPr>
+        <p:blipFill>
+          <a:blip r:embed="rId2"/>
+          <a:stretch>
+            <a:fillRect/>
+          </a:stretch>
+        </p:blipFill>
+        <p:spPr>
+          <a:xfrm>
+            <a:off x="2266950" y="1128712"/>
+            <a:ext cx="7658100" cy="4600575"/>
+          </a:xfrm>
+          <a:prstGeom prst="rect">
+            <a:avLst/>
+          </a:prstGeom>
+        </p:spPr>
+      </p:pic>
+    </p:spTree>
+    <p:extLst>
+      <p:ext uri="{BB962C8B-B14F-4D97-AF65-F5344CB8AC3E}">
+        <p14:creationId xmlns:p14="http://schemas.microsoft.com/office/powerpoint/2010/main" val="2079648759"/>
+      </p:ext>
+    </p:extLst>
+  </p:cSld>
+  <p:clrMapOvr>
+    <a:masterClrMapping/>
+  </p:clrMapOvr>
+</p:sld>
+</file>
+
+<file path=ppt/slides/slide11.xml><?xml version="1.0" encoding="utf-8"?>
+<p:sld xmlns:a="http://schemas.openxmlformats.org/drawingml/2006/main" xmlns:r="http://schemas.openxmlformats.org/officeDocument/2006/relationships" xmlns:p="http://schemas.openxmlformats.org/presentationml/2006/main">
+  <p:cSld>
+    <p:spTree>
+      <p:nvGrpSpPr>
+        <p:cNvPr id="1" name=""/>
+        <p:cNvGrpSpPr/>
+        <p:nvPr/>
+      </p:nvGrpSpPr>
+      <p:grpSpPr>
+        <a:xfrm>
+          <a:off x="0" y="0"/>
+          <a:ext cx="0" cy="0"/>
+          <a:chOff x="0" y="0"/>
+          <a:chExt cx="0" cy="0"/>
+        </a:xfrm>
+      </p:grpSpPr>
+      <p:sp>
+        <p:nvSpPr>
+          <p:cNvPr id="2" name="Cím 1"/>
+          <p:cNvSpPr>
+            <a:spLocks noGrp="1"/>
+          </p:cNvSpPr>
+          <p:nvPr>
+            <p:ph type="title"/>
+          </p:nvPr>
+        </p:nvSpPr>
+        <p:spPr>
+          <a:xfrm>
             <a:off x="4531621" y="609600"/>
             <a:ext cx="2439784" cy="1456267"/>
           </a:xfrm>
@@ -6930,7 +7015,7 @@
 </p:sld>
 </file>
 
-<file path=ppt/slides/slide11.xml><?xml version="1.0" encoding="utf-8"?>
+<file path=ppt/slides/slide12.xml><?xml version="1.0" encoding="utf-8"?>
 <p:sld xmlns:a="http://schemas.openxmlformats.org/drawingml/2006/main" xmlns:r="http://schemas.openxmlformats.org/officeDocument/2006/relationships" xmlns:p="http://schemas.openxmlformats.org/presentationml/2006/main">
   <p:cSld>
     <p:spTree>
@@ -7420,6 +7505,47 @@
           </a:extLst>
         </p:spPr>
       </p:pic>
+      <p:pic>
+        <p:nvPicPr>
+          <p:cNvPr id="1026" name="Picture 2" descr="File:Csharp Logo.png - Wikimedia Commons"/>
+          <p:cNvPicPr>
+            <a:picLocks noChangeAspect="1" noChangeArrowheads="1"/>
+          </p:cNvPicPr>
+          <p:nvPr/>
+        </p:nvPicPr>
+        <p:blipFill>
+          <a:blip r:embed="rId13">
+            <a:extLst>
+              <a:ext uri="{28A0092B-C50C-407E-A947-70E740481C1C}">
+                <a14:useLocalDpi xmlns:a14="http://schemas.microsoft.com/office/drawing/2010/main" val="0"/>
+              </a:ext>
+            </a:extLst>
+          </a:blip>
+          <a:srcRect/>
+          <a:stretch>
+            <a:fillRect/>
+          </a:stretch>
+        </p:blipFill>
+        <p:spPr bwMode="auto">
+          <a:xfrm>
+            <a:off x="4656909" y="-7575"/>
+            <a:ext cx="2404745" cy="2404745"/>
+          </a:xfrm>
+          <a:prstGeom prst="rect">
+            <a:avLst/>
+          </a:prstGeom>
+          <a:noFill/>
+          <a:extLst>
+            <a:ext uri="{909E8E84-426E-40DD-AFC4-6F175D3DCCD1}">
+              <a14:hiddenFill xmlns:a14="http://schemas.microsoft.com/office/drawing/2010/main">
+                <a:solidFill>
+                  <a:srgbClr val="FFFFFF"/>
+                </a:solidFill>
+              </a14:hiddenFill>
+            </a:ext>
+          </a:extLst>
+        </p:spPr>
+      </p:pic>
     </p:spTree>
     <p:extLst>
       <p:ext uri="{BB962C8B-B14F-4D97-AF65-F5344CB8AC3E}">
@@ -7720,6 +7846,36 @@
           <a:chExt cx="0" cy="0"/>
         </a:xfrm>
       </p:grpSpPr>
+      <p:sp>
+        <p:nvSpPr>
+          <p:cNvPr id="2" name="Cím 1"/>
+          <p:cNvSpPr>
+            <a:spLocks noGrp="1"/>
+          </p:cNvSpPr>
+          <p:nvPr>
+            <p:ph type="title"/>
+          </p:nvPr>
+        </p:nvSpPr>
+        <p:spPr>
+          <a:xfrm>
+            <a:off x="300039" y="133351"/>
+            <a:ext cx="2257424" cy="895416"/>
+          </a:xfrm>
+        </p:spPr>
+        <p:txBody>
+          <a:bodyPr>
+            <a:normAutofit/>
+          </a:bodyPr>
+          <a:lstStyle/>
+          <a:p>
+            <a:r>
+              <a:rPr lang="hu-HU" dirty="0" err="1" smtClean="0"/>
+              <a:t>App</a:t>
+            </a:r>
+            <a:endParaRPr lang="hu-HU" dirty="0"/>
+          </a:p>
+        </p:txBody>
+      </p:sp>
       <p:pic>
         <p:nvPicPr>
           <p:cNvPr id="5" name="Kép 4"/>
@@ -7736,32 +7892,8 @@
         </p:blipFill>
         <p:spPr>
           <a:xfrm>
-            <a:off x="2305050" y="609070"/>
-            <a:ext cx="2876550" cy="5848350"/>
-          </a:xfrm>
-          <a:prstGeom prst="rect">
-            <a:avLst/>
-          </a:prstGeom>
-        </p:spPr>
-      </p:pic>
-      <p:pic>
-        <p:nvPicPr>
-          <p:cNvPr id="6" name="Kép 5"/>
-          <p:cNvPicPr>
-            <a:picLocks noChangeAspect="1"/>
-          </p:cNvPicPr>
-          <p:nvPr/>
-        </p:nvPicPr>
-        <p:blipFill>
-          <a:blip r:embed="rId3"/>
-          <a:stretch>
-            <a:fillRect/>
-          </a:stretch>
-        </p:blipFill>
-        <p:spPr>
-          <a:xfrm>
-            <a:off x="6877050" y="609070"/>
-            <a:ext cx="3152775" cy="5848350"/>
+            <a:off x="1757361" y="1009898"/>
+            <a:ext cx="8786813" cy="5328989"/>
           </a:xfrm>
           <a:prstGeom prst="rect">
             <a:avLst/>
@@ -7771,7 +7903,7 @@
     </p:spTree>
     <p:extLst>
       <p:ext uri="{BB962C8B-B14F-4D97-AF65-F5344CB8AC3E}">
-        <p14:creationId xmlns:p14="http://schemas.microsoft.com/office/powerpoint/2010/main" val="3736701249"/>
+        <p14:creationId xmlns:p14="http://schemas.microsoft.com/office/powerpoint/2010/main" val="1408888390"/>
       </p:ext>
     </p:extLst>
   </p:cSld>
@@ -7844,8 +7976,8 @@
         </p:blipFill>
         <p:spPr>
           <a:xfrm>
-            <a:off x="1757361" y="1009898"/>
-            <a:ext cx="8786813" cy="5328989"/>
+            <a:off x="2290762" y="1147762"/>
+            <a:ext cx="7610475" cy="4562475"/>
           </a:xfrm>
           <a:prstGeom prst="rect">
             <a:avLst/>
@@ -7855,7 +7987,7 @@
     </p:spTree>
     <p:extLst>
       <p:ext uri="{BB962C8B-B14F-4D97-AF65-F5344CB8AC3E}">
-        <p14:creationId xmlns:p14="http://schemas.microsoft.com/office/powerpoint/2010/main" val="1408888390"/>
+        <p14:creationId xmlns:p14="http://schemas.microsoft.com/office/powerpoint/2010/main" val="2493352444"/>
       </p:ext>
     </p:extLst>
   </p:cSld>
@@ -7928,8 +8060,8 @@
         </p:blipFill>
         <p:spPr>
           <a:xfrm>
-            <a:off x="2266950" y="1128712"/>
-            <a:ext cx="7658100" cy="4600575"/>
+            <a:off x="2281237" y="1138237"/>
+            <a:ext cx="7629525" cy="4581525"/>
           </a:xfrm>
           <a:prstGeom prst="rect">
             <a:avLst/>
@@ -7939,7 +8071,7 @@
     </p:spTree>
     <p:extLst>
       <p:ext uri="{BB962C8B-B14F-4D97-AF65-F5344CB8AC3E}">
-        <p14:creationId xmlns:p14="http://schemas.microsoft.com/office/powerpoint/2010/main" val="2079648759"/>
+        <p14:creationId xmlns:p14="http://schemas.microsoft.com/office/powerpoint/2010/main" val="3674457891"/>
       </p:ext>
     </p:extLst>
   </p:cSld>
@@ -8763,15 +8895,6 @@
 </file>
 
 <file path=customXml/item2.xml><?xml version="1.0" encoding="utf-8"?>
-<?mso-contentType ?>
-<FormTemplates xmlns="http://schemas.microsoft.com/sharepoint/v3/contenttype/forms">
-  <Display>DocumentLibraryForm</Display>
-  <Edit>DocumentLibraryForm</Edit>
-  <New>DocumentLibraryForm</New>
-</FormTemplates>
-</file>
-
-<file path=customXml/item3.xml><?xml version="1.0" encoding="utf-8"?>
 <ct:contentTypeSchema xmlns:ct="http://schemas.microsoft.com/office/2006/metadata/contentType" xmlns:ma="http://schemas.microsoft.com/office/2006/metadata/properties/metaAttributes" ct:_="" ma:_="" ma:contentTypeName="Document" ma:contentTypeID="0x01010079F111ED35F8CC479449609E8A0923A6" ma:contentTypeVersion="11" ma:contentTypeDescription="Create a new document." ma:contentTypeScope="" ma:versionID="9677210f24a1be23c92c90fd886aa0aa">
   <xsd:schema xmlns:xsd="http://www.w3.org/2001/XMLSchema" xmlns:xs="http://www.w3.org/2001/XMLSchema" xmlns:p="http://schemas.microsoft.com/office/2006/metadata/properties" xmlns:ns2="71af3243-3dd4-4a8d-8c0d-dd76da1f02a5" xmlns:ns3="16c05727-aa75-4e4a-9b5f-8a80a1165891" targetNamespace="http://schemas.microsoft.com/office/2006/metadata/properties" ma:root="true" ma:fieldsID="60e05723c5c1908df1a1a4ebf11d344e" ns2:_="" ns3:_="">
     <xsd:import namespace="71af3243-3dd4-4a8d-8c0d-dd76da1f02a5"/>
@@ -8982,6 +9105,15 @@
 </ct:contentTypeSchema>
 </file>
 
+<file path=customXml/item3.xml><?xml version="1.0" encoding="utf-8"?>
+<?mso-contentType ?>
+<FormTemplates xmlns="http://schemas.microsoft.com/sharepoint/v3/contenttype/forms">
+  <Display>DocumentLibraryForm</Display>
+  <Edit>DocumentLibraryForm</Edit>
+  <New>DocumentLibraryForm</New>
+</FormTemplates>
+</file>
+
 <file path=customXml/itemProps1.xml><?xml version="1.0" encoding="utf-8"?>
 <ds:datastoreItem xmlns:ds="http://schemas.openxmlformats.org/officeDocument/2006/customXml" ds:itemID="{B26D5668-1971-40BB-BC7C-94C9B101AAB7}">
   <ds:schemaRefs>
@@ -9000,14 +9132,6 @@
 </file>
 
 <file path=customXml/itemProps2.xml><?xml version="1.0" encoding="utf-8"?>
-<ds:datastoreItem xmlns:ds="http://schemas.openxmlformats.org/officeDocument/2006/customXml" ds:itemID="{FE57094B-4684-420B-AFE0-4E41CA2AF714}">
-  <ds:schemaRefs>
-    <ds:schemaRef ds:uri="http://schemas.microsoft.com/sharepoint/v3/contenttype/forms"/>
-  </ds:schemaRefs>
-</ds:datastoreItem>
-</file>
-
-<file path=customXml/itemProps3.xml><?xml version="1.0" encoding="utf-8"?>
 <ds:datastoreItem xmlns:ds="http://schemas.openxmlformats.org/officeDocument/2006/customXml" ds:itemID="{3370F4A1-FC59-4361-989F-6C79533DA565}">
   <ds:schemaRefs>
     <ds:schemaRef ds:uri="http://schemas.microsoft.com/office/2006/metadata/contentType"/>
@@ -9024,4 +9148,12 @@
     <ds:schemaRef ds:uri="http://schemas.microsoft.com/internal/obd"/>
   </ds:schemaRefs>
 </ds:datastoreItem>
+</file>
+
+<file path=customXml/itemProps3.xml><?xml version="1.0" encoding="utf-8"?>
+<ds:datastoreItem xmlns:ds="http://schemas.openxmlformats.org/officeDocument/2006/customXml" ds:itemID="{FE57094B-4684-420B-AFE0-4E41CA2AF714}">
+  <ds:schemaRefs>
+    <ds:schemaRef ds:uri="http://schemas.microsoft.com/sharepoint/v3/contenttype/forms"/>
+  </ds:schemaRefs>
+</ds:datastoreItem>
 </file>
</xml_diff>

<commit_message>
Meg egy kicsi aprosag a ppt-ben
</commit_message>
<xml_diff>
--- a/Terület kerület térfogat.pptx
+++ b/Terület kerület térfogat.pptx
@@ -6556,7 +6556,7 @@
                 <a16:creationId xmlns:a16="http://schemas.microsoft.com/office/drawing/2014/main" id="{3D1E5586-8BB5-40F6-96C3-2E87DD7CE5CD}"/>
               </a:ext>
               <a:ext uri="{C183D7F6-B498-43B3-948B-1728B52AA6E4}">
-                <adec:decorative xmlns:adec="http://schemas.microsoft.com/office/drawing/2017/decorative" xmlns="" val="1"/>
+                <adec:decorative xmlns="" xmlns:adec="http://schemas.microsoft.com/office/drawing/2017/decorative" val="1"/>
               </a:ext>
             </a:extLst>
           </p:cNvPr>
@@ -6653,7 +6653,7 @@
                 <a16:creationId xmlns:a16="http://schemas.microsoft.com/office/drawing/2014/main" id="{8A832D40-B9E2-4CE7-9E0A-B35591EA2035}"/>
               </a:ext>
               <a:ext uri="{C183D7F6-B498-43B3-948B-1728B52AA6E4}">
-                <adec:decorative xmlns:adec="http://schemas.microsoft.com/office/drawing/2017/decorative" xmlns="" val="1"/>
+                <adec:decorative xmlns="" xmlns:adec="http://schemas.microsoft.com/office/drawing/2017/decorative" val="1"/>
               </a:ext>
             </a:extLst>
           </p:cNvPr>
@@ -6752,6 +6752,13 @@
   <p:clrMapOvr>
     <a:overrideClrMapping bg1="dk1" tx1="lt1" bg2="dk2" tx2="lt2" accent1="accent1" accent2="accent2" accent3="accent3" accent4="accent4" accent5="accent5" accent6="accent6" hlink="hlink" folHlink="folHlink"/>
   </p:clrMapOvr>
+  <p:timing>
+    <p:tnLst>
+      <p:par>
+        <p:cTn id="1" dur="indefinite" restart="never" nodeType="tmRoot"/>
+      </p:par>
+    </p:tnLst>
+  </p:timing>
 </p:sld>
 </file>
 
@@ -7118,7 +7125,7 @@
         </p:blipFill>
         <p:spPr bwMode="auto">
           <a:xfrm>
-            <a:off x="642309" y="2288475"/>
+            <a:off x="339624" y="2324166"/>
             <a:ext cx="2745948" cy="1544596"/>
           </a:xfrm>
           <a:prstGeom prst="rect">
@@ -7159,7 +7166,7 @@
         </p:blipFill>
         <p:spPr bwMode="auto">
           <a:xfrm>
-            <a:off x="6506802" y="2288475"/>
+            <a:off x="6462485" y="2288475"/>
             <a:ext cx="1615978" cy="1615978"/>
           </a:xfrm>
           <a:prstGeom prst="rect">
@@ -7200,7 +7207,7 @@
         </p:blipFill>
         <p:spPr bwMode="auto">
           <a:xfrm>
-            <a:off x="9095272" y="2397170"/>
+            <a:off x="9455173" y="2397170"/>
             <a:ext cx="1507283" cy="1507283"/>
           </a:xfrm>
           <a:prstGeom prst="rect">
@@ -7282,7 +7289,7 @@
         </p:blipFill>
         <p:spPr bwMode="auto">
           <a:xfrm>
-            <a:off x="606937" y="5182229"/>
+            <a:off x="524553" y="4888306"/>
             <a:ext cx="2376090" cy="1538518"/>
           </a:xfrm>
           <a:prstGeom prst="rect">
@@ -7323,7 +7330,7 @@
         </p:blipFill>
         <p:spPr bwMode="auto">
           <a:xfrm>
-            <a:off x="3955519" y="5182229"/>
+            <a:off x="2900643" y="4866057"/>
             <a:ext cx="1610778" cy="1615979"/>
           </a:xfrm>
           <a:prstGeom prst="rect">
@@ -7364,8 +7371,8 @@
         </p:blipFill>
         <p:spPr bwMode="auto">
           <a:xfrm>
-            <a:off x="6386194" y="5182229"/>
-            <a:ext cx="1736586" cy="1615979"/>
+            <a:off x="5753315" y="5248730"/>
+            <a:ext cx="1418340" cy="1319835"/>
           </a:xfrm>
           <a:prstGeom prst="rect">
             <a:avLst/>
@@ -7405,8 +7412,8 @@
         </p:blipFill>
         <p:spPr bwMode="auto">
           <a:xfrm>
-            <a:off x="9095272" y="5182229"/>
-            <a:ext cx="2585564" cy="1615978"/>
+            <a:off x="9183941" y="5193902"/>
+            <a:ext cx="2276539" cy="1422837"/>
           </a:xfrm>
           <a:prstGeom prst="rect">
             <a:avLst/>
@@ -7446,8 +7453,8 @@
         </p:blipFill>
         <p:spPr bwMode="auto">
           <a:xfrm>
-            <a:off x="-71521" y="228600"/>
-            <a:ext cx="2324929" cy="1549952"/>
+            <a:off x="6887511" y="4888306"/>
+            <a:ext cx="2954543" cy="1969694"/>
           </a:xfrm>
           <a:prstGeom prst="rect">
             <a:avLst/>
@@ -7487,7 +7494,7 @@
         </p:blipFill>
         <p:spPr bwMode="auto">
           <a:xfrm>
-            <a:off x="9492000" y="103576"/>
+            <a:off x="9455173" y="228600"/>
             <a:ext cx="2700000" cy="1800000"/>
           </a:xfrm>
           <a:prstGeom prst="rect">
@@ -7528,7 +7535,7 @@
         </p:blipFill>
         <p:spPr bwMode="auto">
           <a:xfrm>
-            <a:off x="4656909" y="-7575"/>
+            <a:off x="4656909" y="-34749"/>
             <a:ext cx="2404745" cy="2404745"/>
           </a:xfrm>
           <a:prstGeom prst="rect">
@@ -7556,6 +7563,13 @@
   <p:clrMapOvr>
     <a:overrideClrMapping bg1="dk1" tx1="lt1" bg2="dk2" tx2="lt2" accent1="accent1" accent2="accent2" accent3="accent3" accent4="accent4" accent5="accent5" accent6="accent6" hlink="hlink" folHlink="folHlink"/>
   </p:clrMapOvr>
+  <p:timing>
+    <p:tnLst>
+      <p:par>
+        <p:cTn id="1" dur="indefinite" restart="never" nodeType="tmRoot"/>
+      </p:par>
+    </p:tnLst>
+  </p:timing>
 </p:sld>
 </file>
 
@@ -8895,6 +8909,15 @@
 </file>
 
 <file path=customXml/item2.xml><?xml version="1.0" encoding="utf-8"?>
+<?mso-contentType ?>
+<FormTemplates xmlns="http://schemas.microsoft.com/sharepoint/v3/contenttype/forms">
+  <Display>DocumentLibraryForm</Display>
+  <Edit>DocumentLibraryForm</Edit>
+  <New>DocumentLibraryForm</New>
+</FormTemplates>
+</file>
+
+<file path=customXml/item3.xml><?xml version="1.0" encoding="utf-8"?>
 <ct:contentTypeSchema xmlns:ct="http://schemas.microsoft.com/office/2006/metadata/contentType" xmlns:ma="http://schemas.microsoft.com/office/2006/metadata/properties/metaAttributes" ct:_="" ma:_="" ma:contentTypeName="Document" ma:contentTypeID="0x01010079F111ED35F8CC479449609E8A0923A6" ma:contentTypeVersion="11" ma:contentTypeDescription="Create a new document." ma:contentTypeScope="" ma:versionID="9677210f24a1be23c92c90fd886aa0aa">
   <xsd:schema xmlns:xsd="http://www.w3.org/2001/XMLSchema" xmlns:xs="http://www.w3.org/2001/XMLSchema" xmlns:p="http://schemas.microsoft.com/office/2006/metadata/properties" xmlns:ns2="71af3243-3dd4-4a8d-8c0d-dd76da1f02a5" xmlns:ns3="16c05727-aa75-4e4a-9b5f-8a80a1165891" targetNamespace="http://schemas.microsoft.com/office/2006/metadata/properties" ma:root="true" ma:fieldsID="60e05723c5c1908df1a1a4ebf11d344e" ns2:_="" ns3:_="">
     <xsd:import namespace="71af3243-3dd4-4a8d-8c0d-dd76da1f02a5"/>
@@ -9105,15 +9128,6 @@
 </ct:contentTypeSchema>
 </file>
 
-<file path=customXml/item3.xml><?xml version="1.0" encoding="utf-8"?>
-<?mso-contentType ?>
-<FormTemplates xmlns="http://schemas.microsoft.com/sharepoint/v3/contenttype/forms">
-  <Display>DocumentLibraryForm</Display>
-  <Edit>DocumentLibraryForm</Edit>
-  <New>DocumentLibraryForm</New>
-</FormTemplates>
-</file>
-
 <file path=customXml/itemProps1.xml><?xml version="1.0" encoding="utf-8"?>
 <ds:datastoreItem xmlns:ds="http://schemas.openxmlformats.org/officeDocument/2006/customXml" ds:itemID="{B26D5668-1971-40BB-BC7C-94C9B101AAB7}">
   <ds:schemaRefs>
@@ -9132,6 +9146,14 @@
 </file>
 
 <file path=customXml/itemProps2.xml><?xml version="1.0" encoding="utf-8"?>
+<ds:datastoreItem xmlns:ds="http://schemas.openxmlformats.org/officeDocument/2006/customXml" ds:itemID="{FE57094B-4684-420B-AFE0-4E41CA2AF714}">
+  <ds:schemaRefs>
+    <ds:schemaRef ds:uri="http://schemas.microsoft.com/sharepoint/v3/contenttype/forms"/>
+  </ds:schemaRefs>
+</ds:datastoreItem>
+</file>
+
+<file path=customXml/itemProps3.xml><?xml version="1.0" encoding="utf-8"?>
 <ds:datastoreItem xmlns:ds="http://schemas.openxmlformats.org/officeDocument/2006/customXml" ds:itemID="{3370F4A1-FC59-4361-989F-6C79533DA565}">
   <ds:schemaRefs>
     <ds:schemaRef ds:uri="http://schemas.microsoft.com/office/2006/metadata/contentType"/>
@@ -9148,12 +9170,4 @@
     <ds:schemaRef ds:uri="http://schemas.microsoft.com/internal/obd"/>
   </ds:schemaRefs>
 </ds:datastoreItem>
-</file>
-
-<file path=customXml/itemProps3.xml><?xml version="1.0" encoding="utf-8"?>
-<ds:datastoreItem xmlns:ds="http://schemas.openxmlformats.org/officeDocument/2006/customXml" ds:itemID="{FE57094B-4684-420B-AFE0-4E41CA2AF714}">
-  <ds:schemaRefs>
-    <ds:schemaRef ds:uri="http://schemas.microsoft.com/sharepoint/v3/contenttype/forms"/>
-  </ds:schemaRefs>
-</ds:datastoreItem>
 </file>
</xml_diff>